<commit_message>
Add upgrading UI and tower attributes UI
</commit_message>
<xml_diff>
--- a/JellyGo/assets/images/towers/towers_source.pptx
+++ b/JellyGo/assets/images/towers/towers_source.pptx
@@ -246,7 +246,7 @@
           <a:p>
             <a:fld id="{D4B0CC89-2C3D-46CE-869C-BB2DDE310EEE}" type="datetimeFigureOut">
               <a:rPr lang="en-US" smtClean="0"/>
-              <a:t>10/27/2023</a:t>
+              <a:t>11/2/2023</a:t>
             </a:fld>
             <a:endParaRPr lang="en-US"/>
           </a:p>
@@ -416,7 +416,7 @@
           <a:p>
             <a:fld id="{D4B0CC89-2C3D-46CE-869C-BB2DDE310EEE}" type="datetimeFigureOut">
               <a:rPr lang="en-US" smtClean="0"/>
-              <a:t>10/27/2023</a:t>
+              <a:t>11/2/2023</a:t>
             </a:fld>
             <a:endParaRPr lang="en-US"/>
           </a:p>
@@ -596,7 +596,7 @@
           <a:p>
             <a:fld id="{D4B0CC89-2C3D-46CE-869C-BB2DDE310EEE}" type="datetimeFigureOut">
               <a:rPr lang="en-US" smtClean="0"/>
-              <a:t>10/27/2023</a:t>
+              <a:t>11/2/2023</a:t>
             </a:fld>
             <a:endParaRPr lang="en-US"/>
           </a:p>
@@ -766,7 +766,7 @@
           <a:p>
             <a:fld id="{D4B0CC89-2C3D-46CE-869C-BB2DDE310EEE}" type="datetimeFigureOut">
               <a:rPr lang="en-US" smtClean="0"/>
-              <a:t>10/27/2023</a:t>
+              <a:t>11/2/2023</a:t>
             </a:fld>
             <a:endParaRPr lang="en-US"/>
           </a:p>
@@ -1012,7 +1012,7 @@
           <a:p>
             <a:fld id="{D4B0CC89-2C3D-46CE-869C-BB2DDE310EEE}" type="datetimeFigureOut">
               <a:rPr lang="en-US" smtClean="0"/>
-              <a:t>10/27/2023</a:t>
+              <a:t>11/2/2023</a:t>
             </a:fld>
             <a:endParaRPr lang="en-US"/>
           </a:p>
@@ -1244,7 +1244,7 @@
           <a:p>
             <a:fld id="{D4B0CC89-2C3D-46CE-869C-BB2DDE310EEE}" type="datetimeFigureOut">
               <a:rPr lang="en-US" smtClean="0"/>
-              <a:t>10/27/2023</a:t>
+              <a:t>11/2/2023</a:t>
             </a:fld>
             <a:endParaRPr lang="en-US"/>
           </a:p>
@@ -1611,7 +1611,7 @@
           <a:p>
             <a:fld id="{D4B0CC89-2C3D-46CE-869C-BB2DDE310EEE}" type="datetimeFigureOut">
               <a:rPr lang="en-US" smtClean="0"/>
-              <a:t>10/27/2023</a:t>
+              <a:t>11/2/2023</a:t>
             </a:fld>
             <a:endParaRPr lang="en-US"/>
           </a:p>
@@ -1729,7 +1729,7 @@
           <a:p>
             <a:fld id="{D4B0CC89-2C3D-46CE-869C-BB2DDE310EEE}" type="datetimeFigureOut">
               <a:rPr lang="en-US" smtClean="0"/>
-              <a:t>10/27/2023</a:t>
+              <a:t>11/2/2023</a:t>
             </a:fld>
             <a:endParaRPr lang="en-US"/>
           </a:p>
@@ -1824,7 +1824,7 @@
           <a:p>
             <a:fld id="{D4B0CC89-2C3D-46CE-869C-BB2DDE310EEE}" type="datetimeFigureOut">
               <a:rPr lang="en-US" smtClean="0"/>
-              <a:t>10/27/2023</a:t>
+              <a:t>11/2/2023</a:t>
             </a:fld>
             <a:endParaRPr lang="en-US"/>
           </a:p>
@@ -2101,7 +2101,7 @@
           <a:p>
             <a:fld id="{D4B0CC89-2C3D-46CE-869C-BB2DDE310EEE}" type="datetimeFigureOut">
               <a:rPr lang="en-US" smtClean="0"/>
-              <a:t>10/27/2023</a:t>
+              <a:t>11/2/2023</a:t>
             </a:fld>
             <a:endParaRPr lang="en-US"/>
           </a:p>
@@ -2354,7 +2354,7 @@
           <a:p>
             <a:fld id="{D4B0CC89-2C3D-46CE-869C-BB2DDE310EEE}" type="datetimeFigureOut">
               <a:rPr lang="en-US" smtClean="0"/>
-              <a:t>10/27/2023</a:t>
+              <a:t>11/2/2023</a:t>
             </a:fld>
             <a:endParaRPr lang="en-US"/>
           </a:p>
@@ -2567,7 +2567,7 @@
           <a:p>
             <a:fld id="{D4B0CC89-2C3D-46CE-869C-BB2DDE310EEE}" type="datetimeFigureOut">
               <a:rPr lang="en-US" smtClean="0"/>
-              <a:t>10/27/2023</a:t>
+              <a:t>11/2/2023</a:t>
             </a:fld>
             <a:endParaRPr lang="en-US"/>
           </a:p>
@@ -2975,8 +2975,8 @@
       <p:pic>
         <p:nvPicPr>
           <p:cNvPr id="14" name="תמונה 13"/>
-          <p:cNvPicPr>
-            <a:picLocks noChangeAspect="1"/>
+          <p:cNvPicPr preferRelativeResize="0">
+            <a:picLocks/>
           </p:cNvPicPr>
           <p:nvPr/>
         </p:nvPicPr>
@@ -2988,8 +2988,8 @@
         </p:blipFill>
         <p:spPr>
           <a:xfrm>
-            <a:off x="1553775" y="3406746"/>
-            <a:ext cx="298323" cy="381335"/>
+            <a:off x="1547648" y="3406740"/>
+            <a:ext cx="306000" cy="381600"/>
           </a:xfrm>
           <a:prstGeom prst="rect">
             <a:avLst/>
@@ -2999,8 +2999,8 @@
       <p:pic>
         <p:nvPicPr>
           <p:cNvPr id="15" name="תמונה 14"/>
-          <p:cNvPicPr>
-            <a:picLocks noChangeAspect="1"/>
+          <p:cNvPicPr preferRelativeResize="0">
+            <a:picLocks/>
           </p:cNvPicPr>
           <p:nvPr/>
         </p:nvPicPr>
@@ -3012,8 +3012,8 @@
         </p:blipFill>
         <p:spPr>
           <a:xfrm>
-            <a:off x="2116033" y="3406744"/>
-            <a:ext cx="313240" cy="381335"/>
+            <a:off x="2116033" y="3406743"/>
+            <a:ext cx="306000" cy="381600"/>
           </a:xfrm>
           <a:prstGeom prst="rect">
             <a:avLst/>
@@ -3023,8 +3023,8 @@
       <p:pic>
         <p:nvPicPr>
           <p:cNvPr id="16" name="תמונה 15"/>
-          <p:cNvPicPr>
-            <a:picLocks noChangeAspect="1"/>
+          <p:cNvPicPr preferRelativeResize="0">
+            <a:picLocks/>
           </p:cNvPicPr>
           <p:nvPr/>
         </p:nvPicPr>
@@ -3036,8 +3036,8 @@
         </p:blipFill>
         <p:spPr>
           <a:xfrm>
-            <a:off x="2693209" y="3411238"/>
-            <a:ext cx="309548" cy="376841"/>
+            <a:off x="2693209" y="3411237"/>
+            <a:ext cx="306000" cy="381600"/>
           </a:xfrm>
           <a:prstGeom prst="rect">
             <a:avLst/>
@@ -3047,8 +3047,8 @@
       <p:pic>
         <p:nvPicPr>
           <p:cNvPr id="17" name="תמונה 16"/>
-          <p:cNvPicPr>
-            <a:picLocks noChangeAspect="1"/>
+          <p:cNvPicPr preferRelativeResize="0">
+            <a:picLocks/>
           </p:cNvPicPr>
           <p:nvPr/>
         </p:nvPicPr>
@@ -3060,8 +3060,8 @@
         </p:blipFill>
         <p:spPr>
           <a:xfrm>
-            <a:off x="3264929" y="3406743"/>
-            <a:ext cx="298323" cy="381335"/>
+            <a:off x="3264928" y="3406743"/>
+            <a:ext cx="306000" cy="381335"/>
           </a:xfrm>
           <a:prstGeom prst="rect">
             <a:avLst/>
@@ -3122,16 +3122,109 @@
           <a:chExt cx="0" cy="0"/>
         </a:xfrm>
       </p:grpSpPr>
-      <p:sp>
-        <p:nvSpPr>
-          <p:cNvPr id="5" name="מלבן מעוגל 4"/>
+      <p:pic>
+        <p:nvPicPr>
+          <p:cNvPr id="2" name="תמונה 1"/>
+          <p:cNvPicPr>
+            <a:picLocks noChangeAspect="1"/>
+          </p:cNvPicPr>
+          <p:nvPr/>
+        </p:nvPicPr>
+        <p:blipFill rotWithShape="1">
+          <a:blip r:embed="rId2"/>
+          <a:srcRect t="-248" b="-1"/>
+          <a:stretch/>
+        </p:blipFill>
+        <p:spPr>
+          <a:xfrm>
+            <a:off x="2933588" y="3459956"/>
+            <a:ext cx="277355" cy="337406"/>
+          </a:xfrm>
+          <a:prstGeom prst="rect">
+            <a:avLst/>
+          </a:prstGeom>
+        </p:spPr>
+      </p:pic>
+      <p:pic>
+        <p:nvPicPr>
+          <p:cNvPr id="3" name="תמונה 2"/>
+          <p:cNvPicPr>
+            <a:picLocks noChangeAspect="1"/>
+          </p:cNvPicPr>
+          <p:nvPr/>
+        </p:nvPicPr>
+        <p:blipFill rotWithShape="1">
+          <a:blip r:embed="rId3"/>
+          <a:srcRect t="351" b="-2"/>
+          <a:stretch/>
+        </p:blipFill>
+        <p:spPr>
+          <a:xfrm>
+            <a:off x="3423672" y="3462337"/>
+            <a:ext cx="277355" cy="335389"/>
+          </a:xfrm>
+          <a:prstGeom prst="rect">
+            <a:avLst/>
+          </a:prstGeom>
+        </p:spPr>
+      </p:pic>
+      <p:pic>
+        <p:nvPicPr>
+          <p:cNvPr id="4" name="תמונה 3"/>
+          <p:cNvPicPr>
+            <a:picLocks noChangeAspect="1"/>
+          </p:cNvPicPr>
+          <p:nvPr/>
+        </p:nvPicPr>
+        <p:blipFill rotWithShape="1">
+          <a:blip r:embed="rId4"/>
+          <a:srcRect t="101"/>
+          <a:stretch/>
+        </p:blipFill>
+        <p:spPr>
+          <a:xfrm>
+            <a:off x="3913756" y="3400425"/>
+            <a:ext cx="280239" cy="396937"/>
+          </a:xfrm>
+          <a:prstGeom prst="rect">
+            <a:avLst/>
+          </a:prstGeom>
+        </p:spPr>
+      </p:pic>
+      <p:pic>
+        <p:nvPicPr>
+          <p:cNvPr id="7" name="תמונה 6"/>
+          <p:cNvPicPr>
+            <a:picLocks noChangeAspect="1"/>
+          </p:cNvPicPr>
+          <p:nvPr/>
+        </p:nvPicPr>
+        <p:blipFill>
+          <a:blip r:embed="rId5"/>
+          <a:stretch>
+            <a:fillRect/>
+          </a:stretch>
+        </p:blipFill>
+        <p:spPr>
+          <a:xfrm>
+            <a:off x="4406724" y="3358726"/>
+            <a:ext cx="280239" cy="438636"/>
+          </a:xfrm>
+          <a:prstGeom prst="rect">
+            <a:avLst/>
+          </a:prstGeom>
+        </p:spPr>
+      </p:pic>
+      <p:sp>
+        <p:nvSpPr>
+          <p:cNvPr id="19" name="מלבן מעוגל 18"/>
           <p:cNvSpPr/>
           <p:nvPr/>
         </p:nvSpPr>
         <p:spPr>
           <a:xfrm>
-            <a:off x="2136684" y="3508375"/>
-            <a:ext cx="280239" cy="279706"/>
+            <a:off x="2462212" y="3514725"/>
+            <a:ext cx="275941" cy="277200"/>
           </a:xfrm>
           <a:prstGeom prst="roundRect">
             <a:avLst/>
@@ -3189,102 +3282,6 @@
           </a:p>
         </p:txBody>
       </p:sp>
-      <p:pic>
-        <p:nvPicPr>
-          <p:cNvPr id="2" name="תמונה 1"/>
-          <p:cNvPicPr>
-            <a:picLocks noChangeAspect="1"/>
-          </p:cNvPicPr>
-          <p:nvPr/>
-        </p:nvPicPr>
-        <p:blipFill>
-          <a:blip r:embed="rId2"/>
-          <a:stretch>
-            <a:fillRect/>
-          </a:stretch>
-        </p:blipFill>
-        <p:spPr>
-          <a:xfrm>
-            <a:off x="2653349" y="3450431"/>
-            <a:ext cx="277355" cy="337650"/>
-          </a:xfrm>
-          <a:prstGeom prst="rect">
-            <a:avLst/>
-          </a:prstGeom>
-        </p:spPr>
-      </p:pic>
-      <p:pic>
-        <p:nvPicPr>
-          <p:cNvPr id="3" name="תמונה 2"/>
-          <p:cNvPicPr>
-            <a:picLocks noChangeAspect="1"/>
-          </p:cNvPicPr>
-          <p:nvPr/>
-        </p:nvPicPr>
-        <p:blipFill>
-          <a:blip r:embed="rId3"/>
-          <a:stretch>
-            <a:fillRect/>
-          </a:stretch>
-        </p:blipFill>
-        <p:spPr>
-          <a:xfrm>
-            <a:off x="3167130" y="3450431"/>
-            <a:ext cx="277355" cy="337650"/>
-          </a:xfrm>
-          <a:prstGeom prst="rect">
-            <a:avLst/>
-          </a:prstGeom>
-        </p:spPr>
-      </p:pic>
-      <p:pic>
-        <p:nvPicPr>
-          <p:cNvPr id="4" name="תמונה 3"/>
-          <p:cNvPicPr>
-            <a:picLocks noChangeAspect="1"/>
-          </p:cNvPicPr>
-          <p:nvPr/>
-        </p:nvPicPr>
-        <p:blipFill>
-          <a:blip r:embed="rId4"/>
-          <a:stretch>
-            <a:fillRect/>
-          </a:stretch>
-        </p:blipFill>
-        <p:spPr>
-          <a:xfrm>
-            <a:off x="3680911" y="3389465"/>
-            <a:ext cx="280239" cy="398616"/>
-          </a:xfrm>
-          <a:prstGeom prst="rect">
-            <a:avLst/>
-          </a:prstGeom>
-        </p:spPr>
-      </p:pic>
-      <p:pic>
-        <p:nvPicPr>
-          <p:cNvPr id="7" name="תמונה 6"/>
-          <p:cNvPicPr>
-            <a:picLocks noChangeAspect="1"/>
-          </p:cNvPicPr>
-          <p:nvPr/>
-        </p:nvPicPr>
-        <p:blipFill>
-          <a:blip r:embed="rId5"/>
-          <a:stretch>
-            <a:fillRect/>
-          </a:stretch>
-        </p:blipFill>
-        <p:spPr>
-          <a:xfrm>
-            <a:off x="4194692" y="3349445"/>
-            <a:ext cx="280239" cy="438636"/>
-          </a:xfrm>
-          <a:prstGeom prst="rect">
-            <a:avLst/>
-          </a:prstGeom>
-        </p:spPr>
-      </p:pic>
     </p:spTree>
     <p:extLst>
       <p:ext uri="{BB962C8B-B14F-4D97-AF65-F5344CB8AC3E}">

</xml_diff>